<commit_message>
Added Changes to powerpoint for my part
</commit_message>
<xml_diff>
--- a/Project1.pptx
+++ b/Project1.pptx
@@ -5,7 +5,7 @@
     <p:sldMasterId id="2147483648" r:id="rId1"/>
   </p:sldMasterIdLst>
   <p:notesMasterIdLst>
-    <p:notesMasterId r:id="rId15"/>
+    <p:notesMasterId r:id="rId16"/>
   </p:notesMasterIdLst>
   <p:sldIdLst>
     <p:sldId id="256" r:id="rId2"/>
@@ -16,11 +16,12 @@
     <p:sldId id="268" r:id="rId7"/>
     <p:sldId id="265" r:id="rId8"/>
     <p:sldId id="259" r:id="rId9"/>
-    <p:sldId id="260" r:id="rId10"/>
-    <p:sldId id="261" r:id="rId11"/>
-    <p:sldId id="262" r:id="rId12"/>
-    <p:sldId id="263" r:id="rId13"/>
-    <p:sldId id="264" r:id="rId14"/>
+    <p:sldId id="270" r:id="rId10"/>
+    <p:sldId id="260" r:id="rId11"/>
+    <p:sldId id="261" r:id="rId12"/>
+    <p:sldId id="262" r:id="rId13"/>
+    <p:sldId id="263" r:id="rId14"/>
+    <p:sldId id="264" r:id="rId15"/>
   </p:sldIdLst>
   <p:sldSz cx="12192000" cy="6858000"/>
   <p:notesSz cx="6858000" cy="9144000"/>
@@ -120,6 +121,32 @@
     </a:lvl9pPr>
   </p:defaultTextStyle>
   <p:extLst>
+    <p:ext uri="{521415D9-36F7-43E2-AB2F-B90AF26B5E84}">
+      <p14:sectionLst xmlns:p14="http://schemas.microsoft.com/office/powerpoint/2010/main">
+        <p14:section name="Default Section" id="{77369E52-1DC3-4883-8A9F-DBEB01807C26}">
+          <p14:sldIdLst>
+            <p14:sldId id="256"/>
+            <p14:sldId id="257"/>
+            <p14:sldId id="267"/>
+            <p14:sldId id="269"/>
+            <p14:sldId id="258"/>
+            <p14:sldId id="268"/>
+            <p14:sldId id="265"/>
+          </p14:sldIdLst>
+        </p14:section>
+        <p14:section name="Untitled Section" id="{E2DC97CC-C018-4B03-8DBD-8768BDCBFDE7}">
+          <p14:sldIdLst>
+            <p14:sldId id="259"/>
+            <p14:sldId id="270"/>
+            <p14:sldId id="260"/>
+            <p14:sldId id="261"/>
+            <p14:sldId id="262"/>
+            <p14:sldId id="263"/>
+            <p14:sldId id="264"/>
+          </p14:sldIdLst>
+        </p14:section>
+      </p14:sectionLst>
+    </p:ext>
     <p:ext uri="{EFAFB233-063F-42B5-8137-9DF3F51BA10A}">
       <p15:sldGuideLst xmlns:p15="http://schemas.microsoft.com/office/powerpoint/2012/main"/>
     </p:ext>
@@ -566,7 +593,7 @@
           <a:p>
             <a:fld id="{1ABBD873-08CC-CF45-9A1C-8FC61122CEB0}" type="slidenum">
               <a:rPr lang="en-US" smtClean="0"/>
-              <a:t>11</a:t>
+              <a:t>12</a:t>
             </a:fld>
             <a:endParaRPr lang="en-US"/>
           </a:p>
@@ -712,7 +739,7 @@
           <a:p>
             <a:fld id="{1ABBD873-08CC-CF45-9A1C-8FC61122CEB0}" type="slidenum">
               <a:rPr lang="en-US" smtClean="0"/>
-              <a:t>13</a:t>
+              <a:t>14</a:t>
             </a:fld>
             <a:endParaRPr lang="en-US"/>
           </a:p>
@@ -4039,6 +4066,186 @@
       </p:grpSpPr>
       <p:sp>
         <p:nvSpPr>
+          <p:cNvPr id="2" name="Title 1">
+            <a:extLst>
+              <a:ext uri="{FF2B5EF4-FFF2-40B4-BE49-F238E27FC236}">
+                <a16:creationId xmlns:a16="http://schemas.microsoft.com/office/drawing/2014/main" id="{31E8BB90-D390-CA45-AD33-0856F776D88E}"/>
+              </a:ext>
+            </a:extLst>
+          </p:cNvPr>
+          <p:cNvSpPr>
+            <a:spLocks noGrp="1"/>
+          </p:cNvSpPr>
+          <p:nvPr>
+            <p:ph type="title"/>
+          </p:nvPr>
+        </p:nvSpPr>
+        <p:spPr>
+          <a:xfrm>
+            <a:off x="831850" y="414989"/>
+            <a:ext cx="10515600" cy="548640"/>
+          </a:xfrm>
+        </p:spPr>
+        <p:txBody>
+          <a:bodyPr>
+            <a:normAutofit fontScale="90000"/>
+          </a:bodyPr>
+          <a:lstStyle/>
+          <a:p>
+            <a:pPr marL="457200" lvl="1" algn="l"/>
+            <a:r>
+              <a:rPr lang="en-US" sz="3200" kern="1200">
+                <a:solidFill>
+                  <a:schemeClr val="tx1"/>
+                </a:solidFill>
+                <a:latin typeface="+mn-lt"/>
+                <a:ea typeface="+mn-ea"/>
+                <a:cs typeface="+mn-cs"/>
+              </a:rPr>
+              <a:t>5. What percentage of towed cars are abandoned cars?</a:t>
+            </a:r>
+            <a:endParaRPr lang="en-US" sz="3200" kern="1200" dirty="0">
+              <a:solidFill>
+                <a:schemeClr val="tx1"/>
+              </a:solidFill>
+              <a:latin typeface="+mn-lt"/>
+              <a:ea typeface="+mn-ea"/>
+              <a:cs typeface="+mn-cs"/>
+            </a:endParaRPr>
+          </a:p>
+        </p:txBody>
+      </p:sp>
+      <p:sp>
+        <p:nvSpPr>
+          <p:cNvPr id="4" name="Text Placeholder 3">
+            <a:extLst>
+              <a:ext uri="{FF2B5EF4-FFF2-40B4-BE49-F238E27FC236}">
+                <a16:creationId xmlns:a16="http://schemas.microsoft.com/office/drawing/2014/main" id="{B42A0A87-7AC9-864A-B700-0A546169EA59}"/>
+              </a:ext>
+            </a:extLst>
+          </p:cNvPr>
+          <p:cNvSpPr>
+            <a:spLocks noGrp="1"/>
+          </p:cNvSpPr>
+          <p:nvPr>
+            <p:ph type="body" idx="1"/>
+          </p:nvPr>
+        </p:nvSpPr>
+        <p:spPr>
+          <a:xfrm>
+            <a:off x="831850" y="1899138"/>
+            <a:ext cx="10515600" cy="4607169"/>
+          </a:xfrm>
+        </p:spPr>
+        <p:txBody>
+          <a:bodyPr>
+            <a:normAutofit fontScale="92500" lnSpcReduction="10000"/>
+          </a:bodyPr>
+          <a:lstStyle/>
+          <a:p>
+            <a:endParaRPr lang="en-US" dirty="0"/>
+          </a:p>
+          <a:p>
+            <a:endParaRPr lang="en-US" dirty="0"/>
+          </a:p>
+          <a:p>
+            <a:endParaRPr lang="en-US" dirty="0"/>
+          </a:p>
+          <a:p>
+            <a:endParaRPr lang="en-US" dirty="0"/>
+          </a:p>
+          <a:p>
+            <a:endParaRPr lang="en-US" dirty="0"/>
+          </a:p>
+          <a:p>
+            <a:endParaRPr lang="en-US" dirty="0"/>
+          </a:p>
+          <a:p>
+            <a:endParaRPr lang="en-US" dirty="0"/>
+          </a:p>
+          <a:p>
+            <a:endParaRPr lang="en-US" dirty="0"/>
+          </a:p>
+          <a:p>
+            <a:endParaRPr lang="en-US" dirty="0"/>
+          </a:p>
+          <a:p>
+            <a:endParaRPr lang="en-US" dirty="0"/>
+          </a:p>
+          <a:p>
+            <a:r>
+              <a:rPr lang="en-US" sz="1900" dirty="0">
+                <a:solidFill>
+                  <a:schemeClr val="tx1"/>
+                </a:solidFill>
+              </a:rPr>
+              <a:t>Only 3 % of towed cars are abandon cars over the 90 days but that is 138 cars are  abandoned and towed .</a:t>
+            </a:r>
+          </a:p>
+        </p:txBody>
+      </p:sp>
+      <p:pic>
+        <p:nvPicPr>
+          <p:cNvPr id="5" name="Picture 4">
+            <a:extLst>
+              <a:ext uri="{FF2B5EF4-FFF2-40B4-BE49-F238E27FC236}">
+                <a16:creationId xmlns:a16="http://schemas.microsoft.com/office/drawing/2014/main" id="{561A52ED-CD8C-4A16-889F-53997FC152AF}"/>
+              </a:ext>
+            </a:extLst>
+          </p:cNvPr>
+          <p:cNvPicPr>
+            <a:picLocks noChangeAspect="1"/>
+          </p:cNvPicPr>
+          <p:nvPr/>
+        </p:nvPicPr>
+        <p:blipFill>
+          <a:blip r:embed="rId2"/>
+          <a:stretch>
+            <a:fillRect/>
+          </a:stretch>
+        </p:blipFill>
+        <p:spPr>
+          <a:xfrm>
+            <a:off x="2630658" y="1599783"/>
+            <a:ext cx="6566096" cy="3921786"/>
+          </a:xfrm>
+          <a:prstGeom prst="rect">
+            <a:avLst/>
+          </a:prstGeom>
+        </p:spPr>
+      </p:pic>
+    </p:spTree>
+    <p:extLst>
+      <p:ext uri="{BB962C8B-B14F-4D97-AF65-F5344CB8AC3E}">
+        <p14:creationId xmlns:p14="http://schemas.microsoft.com/office/powerpoint/2010/main" val="783432784"/>
+      </p:ext>
+    </p:extLst>
+  </p:cSld>
+  <p:clrMapOvr>
+    <a:masterClrMapping/>
+  </p:clrMapOvr>
+</p:sld>
+</file>
+
+<file path=ppt/slides/slide11.xml><?xml version="1.0" encoding="utf-8"?>
+<p:sld xmlns:a="http://schemas.openxmlformats.org/drawingml/2006/main" xmlns:r="http://schemas.openxmlformats.org/officeDocument/2006/relationships" xmlns:p="http://schemas.openxmlformats.org/presentationml/2006/main">
+  <p:cSld>
+    <p:spTree>
+      <p:nvGrpSpPr>
+        <p:cNvPr id="1" name=""/>
+        <p:cNvGrpSpPr/>
+        <p:nvPr/>
+      </p:nvGrpSpPr>
+      <p:grpSpPr>
+        <a:xfrm>
+          <a:off x="0" y="0"/>
+          <a:ext cx="0" cy="0"/>
+          <a:chOff x="0" y="0"/>
+          <a:chExt cx="0" cy="0"/>
+        </a:xfrm>
+      </p:grpSpPr>
+      <p:sp>
+        <p:nvSpPr>
           <p:cNvPr id="4" name="Title 3">
             <a:extLst>
               <a:ext uri="{FF2B5EF4-FFF2-40B4-BE49-F238E27FC236}">
@@ -4107,7 +4314,7 @@
 </p:sld>
 </file>
 
-<file path=ppt/slides/slide11.xml><?xml version="1.0" encoding="utf-8"?>
+<file path=ppt/slides/slide12.xml><?xml version="1.0" encoding="utf-8"?>
 <p:sld xmlns:a="http://schemas.openxmlformats.org/drawingml/2006/main" xmlns:r="http://schemas.openxmlformats.org/officeDocument/2006/relationships" xmlns:p="http://schemas.openxmlformats.org/presentationml/2006/main">
   <p:cSld>
     <p:spTree>
@@ -4282,7 +4489,7 @@
 </p:sld>
 </file>
 
-<file path=ppt/slides/slide12.xml><?xml version="1.0" encoding="utf-8"?>
+<file path=ppt/slides/slide13.xml><?xml version="1.0" encoding="utf-8"?>
 <p:sld xmlns:a="http://schemas.openxmlformats.org/drawingml/2006/main" xmlns:r="http://schemas.openxmlformats.org/officeDocument/2006/relationships" xmlns:p="http://schemas.openxmlformats.org/presentationml/2006/main">
   <p:cSld>
     <p:spTree>
@@ -4446,7 +4653,7 @@
 </p:sld>
 </file>
 
-<file path=ppt/slides/slide13.xml><?xml version="1.0" encoding="utf-8"?>
+<file path=ppt/slides/slide14.xml><?xml version="1.0" encoding="utf-8"?>
 <p:sld xmlns:a="http://schemas.openxmlformats.org/drawingml/2006/main" xmlns:r="http://schemas.openxmlformats.org/officeDocument/2006/relationships" xmlns:p="http://schemas.openxmlformats.org/presentationml/2006/main">
   <p:cSld>
     <p:spTree>
@@ -4604,7 +4811,7 @@
             </a:pPr>
             <a:r>
               <a:rPr lang="en-US" dirty="0"/>
-              <a:t>Using ”Chicago Towed Vehicles” we wanted to answer these questions:</a:t>
+              <a:t>Using ”Chicago Towed Vehicles and  Abandon cars data” we wanted to answer these questions:</a:t>
             </a:r>
           </a:p>
           <a:p>
@@ -4644,7 +4851,7 @@
             </a:pPr>
             <a:r>
               <a:rPr lang="en-US" dirty="0"/>
-              <a:t>What percentage of abandoned cars are towed?</a:t>
+              <a:t>What percentage of towed cars are abandoned cars?</a:t>
             </a:r>
           </a:p>
           <a:p>
@@ -5432,40 +5639,115 @@
             <p:ph type="title"/>
           </p:nvPr>
         </p:nvSpPr>
-        <p:spPr/>
+        <p:spPr>
+          <a:xfrm>
+            <a:off x="831850" y="618978"/>
+            <a:ext cx="10515600" cy="534573"/>
+          </a:xfrm>
+        </p:spPr>
+        <p:txBody>
+          <a:bodyPr/>
+          <a:lstStyle/>
+          <a:p>
+            <a:r>
+              <a:rPr lang="en-US" sz="3200" dirty="0">
+                <a:latin typeface="Graphik" panose="020B0503030202060203" pitchFamily="34" charset="0"/>
+                <a:ea typeface="+mn-ea"/>
+                <a:cs typeface="+mn-cs"/>
+              </a:rPr>
+              <a:t>3. How long does it take for an abandoned car to be towed?</a:t>
+            </a:r>
+          </a:p>
+        </p:txBody>
+      </p:sp>
+      <p:pic>
+        <p:nvPicPr>
+          <p:cNvPr id="5" name="Picture 4">
+            <a:extLst>
+              <a:ext uri="{FF2B5EF4-FFF2-40B4-BE49-F238E27FC236}">
+                <a16:creationId xmlns:a16="http://schemas.microsoft.com/office/drawing/2014/main" id="{F2512084-37BA-40B3-A8C2-F99F495E7A11}"/>
+              </a:ext>
+            </a:extLst>
+          </p:cNvPr>
+          <p:cNvPicPr>
+            <a:picLocks noChangeAspect="1"/>
+          </p:cNvPicPr>
+          <p:nvPr/>
+        </p:nvPicPr>
+        <p:blipFill>
+          <a:blip r:embed="rId2"/>
+          <a:stretch>
+            <a:fillRect/>
+          </a:stretch>
+        </p:blipFill>
+        <p:spPr>
+          <a:xfrm>
+            <a:off x="1149350" y="1934309"/>
+            <a:ext cx="9214338" cy="1939070"/>
+          </a:xfrm>
+          <a:prstGeom prst="rect">
+            <a:avLst/>
+          </a:prstGeom>
+        </p:spPr>
+      </p:pic>
+      <p:sp>
+        <p:nvSpPr>
+          <p:cNvPr id="4" name="Text Placeholder 3">
+            <a:extLst>
+              <a:ext uri="{FF2B5EF4-FFF2-40B4-BE49-F238E27FC236}">
+                <a16:creationId xmlns:a16="http://schemas.microsoft.com/office/drawing/2014/main" id="{67640997-494C-CF46-9366-A3B4D2C8540C}"/>
+              </a:ext>
+            </a:extLst>
+          </p:cNvPr>
+          <p:cNvSpPr>
+            <a:spLocks noGrp="1"/>
+          </p:cNvSpPr>
+          <p:nvPr>
+            <p:ph type="body" idx="1"/>
+          </p:nvPr>
+        </p:nvSpPr>
+        <p:spPr>
+          <a:xfrm>
+            <a:off x="1149350" y="1441939"/>
+            <a:ext cx="10515600" cy="4401527"/>
+          </a:xfrm>
+        </p:spPr>
         <p:txBody>
           <a:bodyPr/>
           <a:lstStyle/>
           <a:p>
             <a:r>
               <a:rPr lang="en-US" dirty="0"/>
-              <a:t>Questions 3 and 4</a:t>
-            </a:r>
-          </a:p>
-        </p:txBody>
-      </p:sp>
-      <p:sp>
-        <p:nvSpPr>
-          <p:cNvPr id="4" name="Text Placeholder 3">
-            <a:extLst>
-              <a:ext uri="{FF2B5EF4-FFF2-40B4-BE49-F238E27FC236}">
-                <a16:creationId xmlns:a16="http://schemas.microsoft.com/office/drawing/2014/main" id="{67640997-494C-CF46-9366-A3B4D2C8540C}"/>
-              </a:ext>
-            </a:extLst>
-          </p:cNvPr>
-          <p:cNvSpPr>
-            <a:spLocks noGrp="1"/>
-          </p:cNvSpPr>
-          <p:nvPr>
-            <p:ph type="body" idx="1"/>
-          </p:nvPr>
-        </p:nvSpPr>
-        <p:spPr/>
-        <p:txBody>
-          <a:bodyPr/>
-          <a:lstStyle/>
-          <a:p>
-            <a:endParaRPr lang="en-US"/>
+              <a:t>                                                                                                                                                              </a:t>
+            </a:r>
+          </a:p>
+          <a:p>
+            <a:endParaRPr lang="en-US" dirty="0"/>
+          </a:p>
+          <a:p>
+            <a:endParaRPr lang="en-US" dirty="0"/>
+          </a:p>
+          <a:p>
+            <a:endParaRPr lang="en-US" dirty="0"/>
+          </a:p>
+          <a:p>
+            <a:endParaRPr lang="en-US" dirty="0"/>
+          </a:p>
+          <a:p>
+            <a:endParaRPr lang="en-US" dirty="0"/>
+          </a:p>
+          <a:p>
+            <a:r>
+              <a:rPr lang="en-US" sz="1800" dirty="0">
+                <a:solidFill>
+                  <a:schemeClr val="tx1"/>
+                </a:solidFill>
+              </a:rPr>
+              <a:t>Conclusion: It takes about 23 days for a abandon car to be towed from it is reported. Also it was observed that cars reported abandon in  November and December took longer to towed then the cars reported in February and March</a:t>
+            </a:r>
+          </a:p>
+          <a:p>
+            <a:endParaRPr lang="en-US" dirty="0"/>
           </a:p>
         </p:txBody>
       </p:sp>
@@ -5504,7 +5786,7 @@
           <p:cNvPr id="2" name="Title 1">
             <a:extLst>
               <a:ext uri="{FF2B5EF4-FFF2-40B4-BE49-F238E27FC236}">
-                <a16:creationId xmlns:a16="http://schemas.microsoft.com/office/drawing/2014/main" id="{31E8BB90-D390-CA45-AD33-0856F776D88E}"/>
+                <a16:creationId xmlns:a16="http://schemas.microsoft.com/office/drawing/2014/main" id="{3BE0EB24-2896-4CAA-A6F1-092CF2FE8E06}"/>
               </a:ext>
             </a:extLst>
           </p:cNvPr>
@@ -5515,24 +5797,34 @@
             <p:ph type="title"/>
           </p:nvPr>
         </p:nvSpPr>
-        <p:spPr/>
-        <p:txBody>
-          <a:bodyPr/>
-          <a:lstStyle/>
-          <a:p>
-            <a:r>
-              <a:rPr lang="en-US" dirty="0"/>
-              <a:t>Questions 5 and 6</a:t>
-            </a:r>
-          </a:p>
-        </p:txBody>
-      </p:sp>
-      <p:sp>
-        <p:nvSpPr>
-          <p:cNvPr id="4" name="Text Placeholder 3">
-            <a:extLst>
-              <a:ext uri="{FF2B5EF4-FFF2-40B4-BE49-F238E27FC236}">
-                <a16:creationId xmlns:a16="http://schemas.microsoft.com/office/drawing/2014/main" id="{B42A0A87-7AC9-864A-B700-0A546169EA59}"/>
+        <p:spPr>
+          <a:xfrm>
+            <a:off x="831850" y="393896"/>
+            <a:ext cx="10515600" cy="1026941"/>
+          </a:xfrm>
+        </p:spPr>
+        <p:txBody>
+          <a:bodyPr/>
+          <a:lstStyle/>
+          <a:p>
+            <a:pPr algn="ctr"/>
+            <a:r>
+              <a:rPr lang="en-US" sz="3200" dirty="0">
+                <a:latin typeface="+mn-lt"/>
+                <a:ea typeface="+mn-ea"/>
+                <a:cs typeface="+mn-cs"/>
+              </a:rPr>
+              <a:t>Scatter Plot for Abandon cars</a:t>
+            </a:r>
+          </a:p>
+        </p:txBody>
+      </p:sp>
+      <p:sp>
+        <p:nvSpPr>
+          <p:cNvPr id="5" name="Text Placeholder 4">
+            <a:extLst>
+              <a:ext uri="{FF2B5EF4-FFF2-40B4-BE49-F238E27FC236}">
+                <a16:creationId xmlns:a16="http://schemas.microsoft.com/office/drawing/2014/main" id="{50A568E3-80D1-49D1-975D-DD58F63EDF09}"/>
               </a:ext>
             </a:extLst>
           </p:cNvPr>
@@ -5543,19 +5835,54 @@
             <p:ph type="body" idx="1"/>
           </p:nvPr>
         </p:nvSpPr>
-        <p:spPr/>
-        <p:txBody>
-          <a:bodyPr/>
-          <a:lstStyle/>
-          <a:p>
-            <a:endParaRPr lang="en-US"/>
-          </a:p>
-        </p:txBody>
-      </p:sp>
+        <p:spPr>
+          <a:xfrm>
+            <a:off x="831850" y="1420837"/>
+            <a:ext cx="10515600" cy="4668813"/>
+          </a:xfrm>
+        </p:spPr>
+        <p:txBody>
+          <a:bodyPr/>
+          <a:lstStyle/>
+          <a:p>
+            <a:endParaRPr lang="en-US" dirty="0"/>
+          </a:p>
+        </p:txBody>
+      </p:sp>
+      <p:pic>
+        <p:nvPicPr>
+          <p:cNvPr id="7" name="Picture 6">
+            <a:extLst>
+              <a:ext uri="{FF2B5EF4-FFF2-40B4-BE49-F238E27FC236}">
+                <a16:creationId xmlns:a16="http://schemas.microsoft.com/office/drawing/2014/main" id="{232BD121-64BA-404C-ACCC-B659131E6B95}"/>
+              </a:ext>
+            </a:extLst>
+          </p:cNvPr>
+          <p:cNvPicPr>
+            <a:picLocks noChangeAspect="1"/>
+          </p:cNvPicPr>
+          <p:nvPr/>
+        </p:nvPicPr>
+        <p:blipFill>
+          <a:blip r:embed="rId2"/>
+          <a:stretch>
+            <a:fillRect/>
+          </a:stretch>
+        </p:blipFill>
+        <p:spPr>
+          <a:xfrm>
+            <a:off x="604911" y="1420836"/>
+            <a:ext cx="10634589" cy="5437163"/>
+          </a:xfrm>
+          <a:prstGeom prst="rect">
+            <a:avLst/>
+          </a:prstGeom>
+        </p:spPr>
+      </p:pic>
     </p:spTree>
     <p:extLst>
       <p:ext uri="{BB962C8B-B14F-4D97-AF65-F5344CB8AC3E}">
-        <p14:creationId xmlns:p14="http://schemas.microsoft.com/office/powerpoint/2010/main" val="783432784"/>
+        <p14:creationId xmlns:p14="http://schemas.microsoft.com/office/powerpoint/2010/main" val="3179449234"/>
       </p:ext>
     </p:extLst>
   </p:cSld>

</xml_diff>

<commit_message>
presnetation changes for Shelly
</commit_message>
<xml_diff>
--- a/Project1.pptx
+++ b/Project1.pptx
@@ -5,7 +5,7 @@
     <p:sldMasterId id="2147483648" r:id="rId1"/>
   </p:sldMasterIdLst>
   <p:notesMasterIdLst>
-    <p:notesMasterId r:id="rId15"/>
+    <p:notesMasterId r:id="rId16"/>
   </p:notesMasterIdLst>
   <p:sldIdLst>
     <p:sldId id="256" r:id="rId2"/>
@@ -16,11 +16,12 @@
     <p:sldId id="268" r:id="rId7"/>
     <p:sldId id="265" r:id="rId8"/>
     <p:sldId id="259" r:id="rId9"/>
-    <p:sldId id="260" r:id="rId10"/>
-    <p:sldId id="261" r:id="rId11"/>
-    <p:sldId id="262" r:id="rId12"/>
-    <p:sldId id="263" r:id="rId13"/>
-    <p:sldId id="264" r:id="rId14"/>
+    <p:sldId id="270" r:id="rId10"/>
+    <p:sldId id="260" r:id="rId11"/>
+    <p:sldId id="261" r:id="rId12"/>
+    <p:sldId id="262" r:id="rId13"/>
+    <p:sldId id="263" r:id="rId14"/>
+    <p:sldId id="264" r:id="rId15"/>
   </p:sldIdLst>
   <p:sldSz cx="12192000" cy="6858000"/>
   <p:notesSz cx="6858000" cy="9144000"/>
@@ -120,6 +121,32 @@
     </a:lvl9pPr>
   </p:defaultTextStyle>
   <p:extLst>
+    <p:ext uri="{521415D9-36F7-43E2-AB2F-B90AF26B5E84}">
+      <p14:sectionLst xmlns:p14="http://schemas.microsoft.com/office/powerpoint/2010/main">
+        <p14:section name="Default Section" id="{77369E52-1DC3-4883-8A9F-DBEB01807C26}">
+          <p14:sldIdLst>
+            <p14:sldId id="256"/>
+            <p14:sldId id="257"/>
+            <p14:sldId id="267"/>
+            <p14:sldId id="269"/>
+            <p14:sldId id="258"/>
+            <p14:sldId id="268"/>
+            <p14:sldId id="265"/>
+          </p14:sldIdLst>
+        </p14:section>
+        <p14:section name="Untitled Section" id="{E2DC97CC-C018-4B03-8DBD-8768BDCBFDE7}">
+          <p14:sldIdLst>
+            <p14:sldId id="259"/>
+            <p14:sldId id="270"/>
+            <p14:sldId id="260"/>
+            <p14:sldId id="261"/>
+            <p14:sldId id="262"/>
+            <p14:sldId id="263"/>
+            <p14:sldId id="264"/>
+          </p14:sldIdLst>
+        </p14:section>
+      </p14:sectionLst>
+    </p:ext>
     <p:ext uri="{EFAFB233-063F-42B5-8137-9DF3F51BA10A}">
       <p15:sldGuideLst xmlns:p15="http://schemas.microsoft.com/office/powerpoint/2012/main"/>
     </p:ext>
@@ -566,7 +593,7 @@
           <a:p>
             <a:fld id="{1ABBD873-08CC-CF45-9A1C-8FC61122CEB0}" type="slidenum">
               <a:rPr lang="en-US" smtClean="0"/>
-              <a:t>11</a:t>
+              <a:t>12</a:t>
             </a:fld>
             <a:endParaRPr lang="en-US"/>
           </a:p>
@@ -712,7 +739,7 @@
           <a:p>
             <a:fld id="{1ABBD873-08CC-CF45-9A1C-8FC61122CEB0}" type="slidenum">
               <a:rPr lang="en-US" smtClean="0"/>
-              <a:t>13</a:t>
+              <a:t>14</a:t>
             </a:fld>
             <a:endParaRPr lang="en-US"/>
           </a:p>
@@ -4039,6 +4066,186 @@
       </p:grpSpPr>
       <p:sp>
         <p:nvSpPr>
+          <p:cNvPr id="2" name="Title 1">
+            <a:extLst>
+              <a:ext uri="{FF2B5EF4-FFF2-40B4-BE49-F238E27FC236}">
+                <a16:creationId xmlns:a16="http://schemas.microsoft.com/office/drawing/2014/main" id="{31E8BB90-D390-CA45-AD33-0856F776D88E}"/>
+              </a:ext>
+            </a:extLst>
+          </p:cNvPr>
+          <p:cNvSpPr>
+            <a:spLocks noGrp="1"/>
+          </p:cNvSpPr>
+          <p:nvPr>
+            <p:ph type="title"/>
+          </p:nvPr>
+        </p:nvSpPr>
+        <p:spPr>
+          <a:xfrm>
+            <a:off x="831850" y="414989"/>
+            <a:ext cx="10515600" cy="548640"/>
+          </a:xfrm>
+        </p:spPr>
+        <p:txBody>
+          <a:bodyPr>
+            <a:normAutofit fontScale="90000"/>
+          </a:bodyPr>
+          <a:lstStyle/>
+          <a:p>
+            <a:pPr marL="457200" lvl="1" algn="l"/>
+            <a:r>
+              <a:rPr lang="en-US" sz="3200" kern="1200">
+                <a:solidFill>
+                  <a:schemeClr val="tx1"/>
+                </a:solidFill>
+                <a:latin typeface="+mn-lt"/>
+                <a:ea typeface="+mn-ea"/>
+                <a:cs typeface="+mn-cs"/>
+              </a:rPr>
+              <a:t>5. What percentage of towed cars are abandoned cars?</a:t>
+            </a:r>
+            <a:endParaRPr lang="en-US" sz="3200" kern="1200" dirty="0">
+              <a:solidFill>
+                <a:schemeClr val="tx1"/>
+              </a:solidFill>
+              <a:latin typeface="+mn-lt"/>
+              <a:ea typeface="+mn-ea"/>
+              <a:cs typeface="+mn-cs"/>
+            </a:endParaRPr>
+          </a:p>
+        </p:txBody>
+      </p:sp>
+      <p:sp>
+        <p:nvSpPr>
+          <p:cNvPr id="4" name="Text Placeholder 3">
+            <a:extLst>
+              <a:ext uri="{FF2B5EF4-FFF2-40B4-BE49-F238E27FC236}">
+                <a16:creationId xmlns:a16="http://schemas.microsoft.com/office/drawing/2014/main" id="{B42A0A87-7AC9-864A-B700-0A546169EA59}"/>
+              </a:ext>
+            </a:extLst>
+          </p:cNvPr>
+          <p:cNvSpPr>
+            <a:spLocks noGrp="1"/>
+          </p:cNvSpPr>
+          <p:nvPr>
+            <p:ph type="body" idx="1"/>
+          </p:nvPr>
+        </p:nvSpPr>
+        <p:spPr>
+          <a:xfrm>
+            <a:off x="831850" y="1899138"/>
+            <a:ext cx="10515600" cy="4607169"/>
+          </a:xfrm>
+        </p:spPr>
+        <p:txBody>
+          <a:bodyPr>
+            <a:normAutofit fontScale="92500" lnSpcReduction="10000"/>
+          </a:bodyPr>
+          <a:lstStyle/>
+          <a:p>
+            <a:endParaRPr lang="en-US" dirty="0"/>
+          </a:p>
+          <a:p>
+            <a:endParaRPr lang="en-US" dirty="0"/>
+          </a:p>
+          <a:p>
+            <a:endParaRPr lang="en-US" dirty="0"/>
+          </a:p>
+          <a:p>
+            <a:endParaRPr lang="en-US" dirty="0"/>
+          </a:p>
+          <a:p>
+            <a:endParaRPr lang="en-US" dirty="0"/>
+          </a:p>
+          <a:p>
+            <a:endParaRPr lang="en-US" dirty="0"/>
+          </a:p>
+          <a:p>
+            <a:endParaRPr lang="en-US" dirty="0"/>
+          </a:p>
+          <a:p>
+            <a:endParaRPr lang="en-US" dirty="0"/>
+          </a:p>
+          <a:p>
+            <a:endParaRPr lang="en-US" dirty="0"/>
+          </a:p>
+          <a:p>
+            <a:endParaRPr lang="en-US" dirty="0"/>
+          </a:p>
+          <a:p>
+            <a:r>
+              <a:rPr lang="en-US" sz="1900" dirty="0">
+                <a:solidFill>
+                  <a:schemeClr val="tx1"/>
+                </a:solidFill>
+              </a:rPr>
+              <a:t>Only 3 % of towed cars are abandon cars over the 90 days but that is 138 cars are  abandoned and towed .</a:t>
+            </a:r>
+          </a:p>
+        </p:txBody>
+      </p:sp>
+      <p:pic>
+        <p:nvPicPr>
+          <p:cNvPr id="5" name="Picture 4">
+            <a:extLst>
+              <a:ext uri="{FF2B5EF4-FFF2-40B4-BE49-F238E27FC236}">
+                <a16:creationId xmlns:a16="http://schemas.microsoft.com/office/drawing/2014/main" id="{561A52ED-CD8C-4A16-889F-53997FC152AF}"/>
+              </a:ext>
+            </a:extLst>
+          </p:cNvPr>
+          <p:cNvPicPr>
+            <a:picLocks noChangeAspect="1"/>
+          </p:cNvPicPr>
+          <p:nvPr/>
+        </p:nvPicPr>
+        <p:blipFill>
+          <a:blip r:embed="rId2"/>
+          <a:stretch>
+            <a:fillRect/>
+          </a:stretch>
+        </p:blipFill>
+        <p:spPr>
+          <a:xfrm>
+            <a:off x="2630658" y="1599783"/>
+            <a:ext cx="6566096" cy="3921786"/>
+          </a:xfrm>
+          <a:prstGeom prst="rect">
+            <a:avLst/>
+          </a:prstGeom>
+        </p:spPr>
+      </p:pic>
+    </p:spTree>
+    <p:extLst>
+      <p:ext uri="{BB962C8B-B14F-4D97-AF65-F5344CB8AC3E}">
+        <p14:creationId xmlns:p14="http://schemas.microsoft.com/office/powerpoint/2010/main" val="783432784"/>
+      </p:ext>
+    </p:extLst>
+  </p:cSld>
+  <p:clrMapOvr>
+    <a:masterClrMapping/>
+  </p:clrMapOvr>
+</p:sld>
+</file>
+
+<file path=ppt/slides/slide11.xml><?xml version="1.0" encoding="utf-8"?>
+<p:sld xmlns:a="http://schemas.openxmlformats.org/drawingml/2006/main" xmlns:r="http://schemas.openxmlformats.org/officeDocument/2006/relationships" xmlns:p="http://schemas.openxmlformats.org/presentationml/2006/main">
+  <p:cSld>
+    <p:spTree>
+      <p:nvGrpSpPr>
+        <p:cNvPr id="1" name=""/>
+        <p:cNvGrpSpPr/>
+        <p:nvPr/>
+      </p:nvGrpSpPr>
+      <p:grpSpPr>
+        <a:xfrm>
+          <a:off x="0" y="0"/>
+          <a:ext cx="0" cy="0"/>
+          <a:chOff x="0" y="0"/>
+          <a:chExt cx="0" cy="0"/>
+        </a:xfrm>
+      </p:grpSpPr>
+      <p:sp>
+        <p:nvSpPr>
           <p:cNvPr id="4" name="Title 3">
             <a:extLst>
               <a:ext uri="{FF2B5EF4-FFF2-40B4-BE49-F238E27FC236}">
@@ -4107,7 +4314,7 @@
 </p:sld>
 </file>
 
-<file path=ppt/slides/slide11.xml><?xml version="1.0" encoding="utf-8"?>
+<file path=ppt/slides/slide12.xml><?xml version="1.0" encoding="utf-8"?>
 <p:sld xmlns:a="http://schemas.openxmlformats.org/drawingml/2006/main" xmlns:r="http://schemas.openxmlformats.org/officeDocument/2006/relationships" xmlns:p="http://schemas.openxmlformats.org/presentationml/2006/main">
   <p:cSld>
     <p:spTree>
@@ -4282,7 +4489,7 @@
 </p:sld>
 </file>
 
-<file path=ppt/slides/slide12.xml><?xml version="1.0" encoding="utf-8"?>
+<file path=ppt/slides/slide13.xml><?xml version="1.0" encoding="utf-8"?>
 <p:sld xmlns:a="http://schemas.openxmlformats.org/drawingml/2006/main" xmlns:r="http://schemas.openxmlformats.org/officeDocument/2006/relationships" xmlns:p="http://schemas.openxmlformats.org/presentationml/2006/main">
   <p:cSld>
     <p:spTree>
@@ -4446,7 +4653,7 @@
 </p:sld>
 </file>
 
-<file path=ppt/slides/slide13.xml><?xml version="1.0" encoding="utf-8"?>
+<file path=ppt/slides/slide14.xml><?xml version="1.0" encoding="utf-8"?>
 <p:sld xmlns:a="http://schemas.openxmlformats.org/drawingml/2006/main" xmlns:r="http://schemas.openxmlformats.org/officeDocument/2006/relationships" xmlns:p="http://schemas.openxmlformats.org/presentationml/2006/main">
   <p:cSld>
     <p:spTree>
@@ -4604,7 +4811,7 @@
             </a:pPr>
             <a:r>
               <a:rPr lang="en-US" dirty="0"/>
-              <a:t>Using ”Chicago Towed Vehicles” we wanted to answer these questions:</a:t>
+              <a:t>Using ”Chicago Towed Vehicles and  Abandon cars data” we wanted to answer these questions:</a:t>
             </a:r>
           </a:p>
           <a:p>
@@ -4644,7 +4851,7 @@
             </a:pPr>
             <a:r>
               <a:rPr lang="en-US" dirty="0"/>
-              <a:t>What percentage of abandoned cars are towed?</a:t>
+              <a:t>What percentage of towed cars are abandoned cars?</a:t>
             </a:r>
           </a:p>
           <a:p>
@@ -4888,7 +5095,19 @@
               <a:rPr lang="en-US" sz="3200" dirty="0">
                 <a:latin typeface="Graphik" panose="020B0503030202060203" pitchFamily="34" charset="0"/>
               </a:rPr>
-              <a:t>Does the day of the week have an any impact?</a:t>
+              <a:t>Does the day of the week </a:t>
+            </a:r>
+            <a:r>
+              <a:rPr lang="en-US" sz="3200">
+                <a:latin typeface="Graphik" panose="020B0503030202060203" pitchFamily="34" charset="0"/>
+              </a:rPr>
+              <a:t>have any </a:t>
+            </a:r>
+            <a:r>
+              <a:rPr lang="en-US" sz="3200" dirty="0">
+                <a:latin typeface="Graphik" panose="020B0503030202060203" pitchFamily="34" charset="0"/>
+              </a:rPr>
+              <a:t>impact?</a:t>
             </a:r>
           </a:p>
         </p:txBody>
@@ -4915,7 +5134,7 @@
         </p:blipFill>
         <p:spPr>
           <a:xfrm>
-            <a:off x="1806314" y="1474414"/>
+            <a:off x="1806314" y="1409075"/>
             <a:ext cx="8094689" cy="4083189"/>
           </a:xfrm>
           <a:prstGeom prst="rect">
@@ -5432,40 +5651,115 @@
             <p:ph type="title"/>
           </p:nvPr>
         </p:nvSpPr>
-        <p:spPr/>
+        <p:spPr>
+          <a:xfrm>
+            <a:off x="831850" y="618978"/>
+            <a:ext cx="10515600" cy="534573"/>
+          </a:xfrm>
+        </p:spPr>
+        <p:txBody>
+          <a:bodyPr/>
+          <a:lstStyle/>
+          <a:p>
+            <a:r>
+              <a:rPr lang="en-US" sz="3200" dirty="0">
+                <a:latin typeface="Graphik" panose="020B0503030202060203" pitchFamily="34" charset="0"/>
+                <a:ea typeface="+mn-ea"/>
+                <a:cs typeface="+mn-cs"/>
+              </a:rPr>
+              <a:t>3. How long does it take for an abandoned car to be towed?</a:t>
+            </a:r>
+          </a:p>
+        </p:txBody>
+      </p:sp>
+      <p:pic>
+        <p:nvPicPr>
+          <p:cNvPr id="5" name="Picture 4">
+            <a:extLst>
+              <a:ext uri="{FF2B5EF4-FFF2-40B4-BE49-F238E27FC236}">
+                <a16:creationId xmlns:a16="http://schemas.microsoft.com/office/drawing/2014/main" id="{F2512084-37BA-40B3-A8C2-F99F495E7A11}"/>
+              </a:ext>
+            </a:extLst>
+          </p:cNvPr>
+          <p:cNvPicPr>
+            <a:picLocks noChangeAspect="1"/>
+          </p:cNvPicPr>
+          <p:nvPr/>
+        </p:nvPicPr>
+        <p:blipFill>
+          <a:blip r:embed="rId2"/>
+          <a:stretch>
+            <a:fillRect/>
+          </a:stretch>
+        </p:blipFill>
+        <p:spPr>
+          <a:xfrm>
+            <a:off x="1149350" y="1934309"/>
+            <a:ext cx="9214338" cy="1939070"/>
+          </a:xfrm>
+          <a:prstGeom prst="rect">
+            <a:avLst/>
+          </a:prstGeom>
+        </p:spPr>
+      </p:pic>
+      <p:sp>
+        <p:nvSpPr>
+          <p:cNvPr id="4" name="Text Placeholder 3">
+            <a:extLst>
+              <a:ext uri="{FF2B5EF4-FFF2-40B4-BE49-F238E27FC236}">
+                <a16:creationId xmlns:a16="http://schemas.microsoft.com/office/drawing/2014/main" id="{67640997-494C-CF46-9366-A3B4D2C8540C}"/>
+              </a:ext>
+            </a:extLst>
+          </p:cNvPr>
+          <p:cNvSpPr>
+            <a:spLocks noGrp="1"/>
+          </p:cNvSpPr>
+          <p:nvPr>
+            <p:ph type="body" idx="1"/>
+          </p:nvPr>
+        </p:nvSpPr>
+        <p:spPr>
+          <a:xfrm>
+            <a:off x="1149350" y="1441939"/>
+            <a:ext cx="10515600" cy="4401527"/>
+          </a:xfrm>
+        </p:spPr>
         <p:txBody>
           <a:bodyPr/>
           <a:lstStyle/>
           <a:p>
             <a:r>
               <a:rPr lang="en-US" dirty="0"/>
-              <a:t>Questions 3 and 4</a:t>
-            </a:r>
-          </a:p>
-        </p:txBody>
-      </p:sp>
-      <p:sp>
-        <p:nvSpPr>
-          <p:cNvPr id="4" name="Text Placeholder 3">
-            <a:extLst>
-              <a:ext uri="{FF2B5EF4-FFF2-40B4-BE49-F238E27FC236}">
-                <a16:creationId xmlns:a16="http://schemas.microsoft.com/office/drawing/2014/main" id="{67640997-494C-CF46-9366-A3B4D2C8540C}"/>
-              </a:ext>
-            </a:extLst>
-          </p:cNvPr>
-          <p:cNvSpPr>
-            <a:spLocks noGrp="1"/>
-          </p:cNvSpPr>
-          <p:nvPr>
-            <p:ph type="body" idx="1"/>
-          </p:nvPr>
-        </p:nvSpPr>
-        <p:spPr/>
-        <p:txBody>
-          <a:bodyPr/>
-          <a:lstStyle/>
-          <a:p>
-            <a:endParaRPr lang="en-US"/>
+              <a:t>                                                                                                                                                              </a:t>
+            </a:r>
+          </a:p>
+          <a:p>
+            <a:endParaRPr lang="en-US" dirty="0"/>
+          </a:p>
+          <a:p>
+            <a:endParaRPr lang="en-US" dirty="0"/>
+          </a:p>
+          <a:p>
+            <a:endParaRPr lang="en-US" dirty="0"/>
+          </a:p>
+          <a:p>
+            <a:endParaRPr lang="en-US" dirty="0"/>
+          </a:p>
+          <a:p>
+            <a:endParaRPr lang="en-US" dirty="0"/>
+          </a:p>
+          <a:p>
+            <a:r>
+              <a:rPr lang="en-US" sz="1800" dirty="0">
+                <a:solidFill>
+                  <a:schemeClr val="tx1"/>
+                </a:solidFill>
+              </a:rPr>
+              <a:t>Conclusion: It takes about 23 days for a abandon car to be towed from it is reported. Also it was observed that cars reported abandon in  November and December took longer to towed then the cars reported in February and March</a:t>
+            </a:r>
+          </a:p>
+          <a:p>
+            <a:endParaRPr lang="en-US" dirty="0"/>
           </a:p>
         </p:txBody>
       </p:sp>
@@ -5504,7 +5798,7 @@
           <p:cNvPr id="2" name="Title 1">
             <a:extLst>
               <a:ext uri="{FF2B5EF4-FFF2-40B4-BE49-F238E27FC236}">
-                <a16:creationId xmlns:a16="http://schemas.microsoft.com/office/drawing/2014/main" id="{31E8BB90-D390-CA45-AD33-0856F776D88E}"/>
+                <a16:creationId xmlns:a16="http://schemas.microsoft.com/office/drawing/2014/main" id="{3BE0EB24-2896-4CAA-A6F1-092CF2FE8E06}"/>
               </a:ext>
             </a:extLst>
           </p:cNvPr>
@@ -5515,24 +5809,34 @@
             <p:ph type="title"/>
           </p:nvPr>
         </p:nvSpPr>
-        <p:spPr/>
-        <p:txBody>
-          <a:bodyPr/>
-          <a:lstStyle/>
-          <a:p>
-            <a:r>
-              <a:rPr lang="en-US" dirty="0"/>
-              <a:t>Questions 5 and 6</a:t>
-            </a:r>
-          </a:p>
-        </p:txBody>
-      </p:sp>
-      <p:sp>
-        <p:nvSpPr>
-          <p:cNvPr id="4" name="Text Placeholder 3">
-            <a:extLst>
-              <a:ext uri="{FF2B5EF4-FFF2-40B4-BE49-F238E27FC236}">
-                <a16:creationId xmlns:a16="http://schemas.microsoft.com/office/drawing/2014/main" id="{B42A0A87-7AC9-864A-B700-0A546169EA59}"/>
+        <p:spPr>
+          <a:xfrm>
+            <a:off x="831850" y="393896"/>
+            <a:ext cx="10515600" cy="1026941"/>
+          </a:xfrm>
+        </p:spPr>
+        <p:txBody>
+          <a:bodyPr/>
+          <a:lstStyle/>
+          <a:p>
+            <a:pPr algn="ctr"/>
+            <a:r>
+              <a:rPr lang="en-US" sz="3200" dirty="0">
+                <a:latin typeface="+mn-lt"/>
+                <a:ea typeface="+mn-ea"/>
+                <a:cs typeface="+mn-cs"/>
+              </a:rPr>
+              <a:t>Scatter Plot for Abandon cars</a:t>
+            </a:r>
+          </a:p>
+        </p:txBody>
+      </p:sp>
+      <p:sp>
+        <p:nvSpPr>
+          <p:cNvPr id="5" name="Text Placeholder 4">
+            <a:extLst>
+              <a:ext uri="{FF2B5EF4-FFF2-40B4-BE49-F238E27FC236}">
+                <a16:creationId xmlns:a16="http://schemas.microsoft.com/office/drawing/2014/main" id="{50A568E3-80D1-49D1-975D-DD58F63EDF09}"/>
               </a:ext>
             </a:extLst>
           </p:cNvPr>
@@ -5543,19 +5847,54 @@
             <p:ph type="body" idx="1"/>
           </p:nvPr>
         </p:nvSpPr>
-        <p:spPr/>
-        <p:txBody>
-          <a:bodyPr/>
-          <a:lstStyle/>
-          <a:p>
-            <a:endParaRPr lang="en-US"/>
-          </a:p>
-        </p:txBody>
-      </p:sp>
+        <p:spPr>
+          <a:xfrm>
+            <a:off x="831850" y="1420837"/>
+            <a:ext cx="10515600" cy="4668813"/>
+          </a:xfrm>
+        </p:spPr>
+        <p:txBody>
+          <a:bodyPr/>
+          <a:lstStyle/>
+          <a:p>
+            <a:endParaRPr lang="en-US" dirty="0"/>
+          </a:p>
+        </p:txBody>
+      </p:sp>
+      <p:pic>
+        <p:nvPicPr>
+          <p:cNvPr id="7" name="Picture 6">
+            <a:extLst>
+              <a:ext uri="{FF2B5EF4-FFF2-40B4-BE49-F238E27FC236}">
+                <a16:creationId xmlns:a16="http://schemas.microsoft.com/office/drawing/2014/main" id="{232BD121-64BA-404C-ACCC-B659131E6B95}"/>
+              </a:ext>
+            </a:extLst>
+          </p:cNvPr>
+          <p:cNvPicPr>
+            <a:picLocks noChangeAspect="1"/>
+          </p:cNvPicPr>
+          <p:nvPr/>
+        </p:nvPicPr>
+        <p:blipFill>
+          <a:blip r:embed="rId2"/>
+          <a:stretch>
+            <a:fillRect/>
+          </a:stretch>
+        </p:blipFill>
+        <p:spPr>
+          <a:xfrm>
+            <a:off x="604911" y="1420836"/>
+            <a:ext cx="10634589" cy="5437163"/>
+          </a:xfrm>
+          <a:prstGeom prst="rect">
+            <a:avLst/>
+          </a:prstGeom>
+        </p:spPr>
+      </p:pic>
     </p:spTree>
     <p:extLst>
       <p:ext uri="{BB962C8B-B14F-4D97-AF65-F5344CB8AC3E}">
-        <p14:creationId xmlns:p14="http://schemas.microsoft.com/office/powerpoint/2010/main" val="783432784"/>
+        <p14:creationId xmlns:p14="http://schemas.microsoft.com/office/powerpoint/2010/main" val="3179449234"/>
       </p:ext>
     </p:extLst>
   </p:cSld>

</xml_diff>

<commit_message>
updated PP presentation file with Dann's notes
used the existing file, downloaded it, added my speaking notes and uploaded the file.
</commit_message>
<xml_diff>
--- a/Project1.pptx
+++ b/Project1.pptx
@@ -5,7 +5,7 @@
     <p:sldMasterId id="2147483648" r:id="rId1"/>
   </p:sldMasterIdLst>
   <p:notesMasterIdLst>
-    <p:notesMasterId r:id="rId16"/>
+    <p:notesMasterId r:id="rId17"/>
   </p:notesMasterIdLst>
   <p:sldIdLst>
     <p:sldId id="256" r:id="rId2"/>
@@ -22,6 +22,7 @@
     <p:sldId id="262" r:id="rId13"/>
     <p:sldId id="263" r:id="rId14"/>
     <p:sldId id="264" r:id="rId15"/>
+    <p:sldId id="271" r:id="rId16"/>
   </p:sldIdLst>
   <p:sldSz cx="12192000" cy="6858000"/>
   <p:notesSz cx="6858000" cy="9144000"/>
@@ -143,6 +144,7 @@
             <p14:sldId id="262"/>
             <p14:sldId id="263"/>
             <p14:sldId id="264"/>
+            <p14:sldId id="271"/>
           </p14:sldIdLst>
         </p14:section>
       </p14:sectionLst>
@@ -203,7 +205,7 @@
             </a:lvl1pPr>
           </a:lstStyle>
           <a:p>
-            <a:endParaRPr lang="en-US"/>
+            <a:endParaRPr lang="en-US" dirty="0"/>
           </a:p>
         </p:txBody>
       </p:sp>
@@ -236,9 +238,9 @@
           <a:p>
             <a:fld id="{723FBAB7-38B8-9742-998A-D23EB28787A2}" type="datetimeFigureOut">
               <a:rPr lang="en-US" smtClean="0"/>
-              <a:t>3/30/2019</a:t>
+              <a:t>3/30/19</a:t>
             </a:fld>
-            <a:endParaRPr lang="en-US"/>
+            <a:endParaRPr lang="en-US" dirty="0"/>
           </a:p>
         </p:txBody>
       </p:sp>
@@ -271,7 +273,7 @@
           <a:bodyPr vert="horz" lIns="91440" tIns="45720" rIns="91440" bIns="45720" rtlCol="0" anchor="ctr"/>
           <a:lstStyle/>
           <a:p>
-            <a:endParaRPr lang="en-US"/>
+            <a:endParaRPr lang="en-US" dirty="0"/>
           </a:p>
         </p:txBody>
       </p:sp>
@@ -361,7 +363,7 @@
             </a:lvl1pPr>
           </a:lstStyle>
           <a:p>
-            <a:endParaRPr lang="en-US"/>
+            <a:endParaRPr lang="en-US" dirty="0"/>
           </a:p>
         </p:txBody>
       </p:sp>
@@ -396,7 +398,7 @@
               <a:rPr lang="en-US" smtClean="0"/>
               <a:t>‹#›</a:t>
             </a:fld>
-            <a:endParaRPr lang="en-US"/>
+            <a:endParaRPr lang="en-US" dirty="0"/>
           </a:p>
         </p:txBody>
       </p:sp>
@@ -547,32 +549,86 @@
           <a:bodyPr/>
           <a:lstStyle/>
           <a:p>
-            <a:r>
-              <a:rPr lang="en-US" sz="1200" kern="1200" dirty="0">
-                <a:solidFill>
-                  <a:schemeClr val="tx1"/>
-                </a:solidFill>
-                <a:effectLst/>
-                <a:latin typeface="+mn-lt"/>
-                <a:ea typeface="+mn-ea"/>
-                <a:cs typeface="+mn-cs"/>
-              </a:rPr>
-              <a:t>We wanted to know to which facility of the four are the cars towed?</a:t>
-            </a:r>
-          </a:p>
-          <a:p>
-            <a:r>
-              <a:rPr lang="en-US" sz="1200" kern="1200" dirty="0">
-                <a:solidFill>
-                  <a:schemeClr val="tx1"/>
-                </a:solidFill>
-                <a:effectLst/>
-                <a:latin typeface="+mn-lt"/>
-                <a:ea typeface="+mn-ea"/>
-                <a:cs typeface="+mn-cs"/>
-              </a:rPr>
-              <a:t>Most of the cars were towed to the 10300 S Doty location (50%), followed by the 701 N. Sacramento site (48%), then Lower Wacker and (2%) and finally ORD.</a:t>
-            </a:r>
+            <a:pPr marL="0" marR="0" lvl="0" indent="0" algn="l" defTabSz="914400" rtl="0" eaLnBrk="1" fontAlgn="auto" latinLnBrk="0" hangingPunct="1">
+              <a:lnSpc>
+                <a:spcPct val="100000"/>
+              </a:lnSpc>
+              <a:spcBef>
+                <a:spcPts val="0"/>
+              </a:spcBef>
+              <a:spcAft>
+                <a:spcPts val="0"/>
+              </a:spcAft>
+              <a:buClrTx/>
+              <a:buSzTx/>
+              <a:buFontTx/>
+              <a:buNone/>
+              <a:tabLst/>
+              <a:defRPr/>
+            </a:pPr>
+            <a:r>
+              <a:rPr lang="en-US" dirty="0"/>
+              <a:t>To figure this out, we counted how many cars went to each lot, and then using the address of the lot as provided in the dataset, geocoded the lots using Google’s geocoding API service. The heatmaps show the concentration of cars per lot, based on the total number of cars in the dataset. We’re confident we can assign any car in the dataset to the area in RED.</a:t>
+            </a:r>
+          </a:p>
+          <a:p>
+            <a:endParaRPr lang="en-US" dirty="0"/>
+          </a:p>
+          <a:p>
+            <a:r>
+              <a:rPr lang="en-US" dirty="0"/>
+              <a:t>Here we looked at to which of the four locations in our data set a car could be towed:</a:t>
+            </a:r>
+          </a:p>
+          <a:p>
+            <a:endParaRPr lang="en-US" dirty="0"/>
+          </a:p>
+          <a:p>
+            <a:pPr marL="0" marR="0" lvl="0" indent="0" algn="l" defTabSz="914400" rtl="0" eaLnBrk="1" fontAlgn="auto" latinLnBrk="0" hangingPunct="1">
+              <a:lnSpc>
+                <a:spcPct val="100000"/>
+              </a:lnSpc>
+              <a:spcBef>
+                <a:spcPts val="0"/>
+              </a:spcBef>
+              <a:spcAft>
+                <a:spcPts val="0"/>
+              </a:spcAft>
+              <a:buClrTx/>
+              <a:buSzTx/>
+              <a:buFontTx/>
+              <a:buNone/>
+              <a:tabLst/>
+              <a:defRPr/>
+            </a:pPr>
+            <a:r>
+              <a:rPr lang="en-US" dirty="0"/>
+              <a:t>10300 S Doty: 2,315 cars</a:t>
+            </a:r>
+          </a:p>
+          <a:p>
+            <a:r>
+              <a:rPr lang="en-US" dirty="0"/>
+              <a:t>701 N Sacramento: 2,203 cars</a:t>
+            </a:r>
+          </a:p>
+          <a:p>
+            <a:r>
+              <a:rPr lang="en-US" dirty="0"/>
+              <a:t>400 E Lower Wacker: 87 cars</a:t>
+            </a:r>
+          </a:p>
+          <a:p>
+            <a:r>
+              <a:rPr lang="en-US" dirty="0"/>
+              <a:t>ORD: five cars </a:t>
+            </a:r>
+          </a:p>
+          <a:p>
+            <a:endParaRPr lang="en-US" dirty="0"/>
+          </a:p>
+          <a:p>
+            <a:endParaRPr lang="en-US" dirty="0"/>
           </a:p>
         </p:txBody>
       </p:sp>
@@ -593,16 +649,16 @@
           <a:p>
             <a:fld id="{1ABBD873-08CC-CF45-9A1C-8FC61122CEB0}" type="slidenum">
               <a:rPr lang="en-US" smtClean="0"/>
-              <a:t>12</a:t>
+              <a:t>11</a:t>
             </a:fld>
-            <a:endParaRPr lang="en-US"/>
+            <a:endParaRPr lang="en-US" dirty="0"/>
           </a:p>
         </p:txBody>
       </p:sp>
     </p:spTree>
     <p:extLst>
       <p:ext uri="{BB962C8B-B14F-4D97-AF65-F5344CB8AC3E}">
-        <p14:creationId xmlns:p14="http://schemas.microsoft.com/office/powerpoint/2010/main" val="419392367"/>
+        <p14:creationId xmlns:p14="http://schemas.microsoft.com/office/powerpoint/2010/main" val="2417568180"/>
       </p:ext>
     </p:extLst>
   </p:cSld>
@@ -666,7 +722,7 @@
                 <a:ea typeface="+mn-ea"/>
                 <a:cs typeface="+mn-cs"/>
               </a:rPr>
-              <a:t>Using the Plate variable in the dataset, we looked at to which lot each vehicle went. We see here in the states represented in each of the tow lots. </a:t>
+              <a:t>We wanted to know to which facility of the four are the cars towed?</a:t>
             </a:r>
           </a:p>
           <a:p>
@@ -680,12 +736,101 @@
                 <a:ea typeface="+mn-ea"/>
                 <a:cs typeface="+mn-cs"/>
               </a:rPr>
-              <a:t>Looking at this chart, we see 37 states different states represented in Chicago tow lots. Illinois is represented most frequently and in each of the four lots. Indiana, Wisconsin, and Michigan are well represented by percentage as well as in each three of the four lots. </a:t>
-            </a:r>
-          </a:p>
-          <a:p>
-            <a:endParaRPr lang="en-US" dirty="0"/>
-          </a:p>
+              <a:t>Most of the cars were towed to the 10300 S Doty location (50%) and five cars to ORD.</a:t>
+            </a:r>
+          </a:p>
+          <a:p>
+            <a:endParaRPr lang="en-US" sz="1200" kern="1200" dirty="0">
+              <a:solidFill>
+                <a:schemeClr val="tx1"/>
+              </a:solidFill>
+              <a:effectLst/>
+              <a:latin typeface="+mn-lt"/>
+              <a:ea typeface="+mn-ea"/>
+              <a:cs typeface="+mn-cs"/>
+            </a:endParaRPr>
+          </a:p>
+        </p:txBody>
+      </p:sp>
+      <p:sp>
+        <p:nvSpPr>
+          <p:cNvPr id="4" name="Slide Number Placeholder 3"/>
+          <p:cNvSpPr>
+            <a:spLocks noGrp="1"/>
+          </p:cNvSpPr>
+          <p:nvPr>
+            <p:ph type="sldNum" sz="quarter" idx="5"/>
+          </p:nvPr>
+        </p:nvSpPr>
+        <p:spPr/>
+        <p:txBody>
+          <a:bodyPr/>
+          <a:lstStyle/>
+          <a:p>
+            <a:fld id="{1ABBD873-08CC-CF45-9A1C-8FC61122CEB0}" type="slidenum">
+              <a:rPr lang="en-US" smtClean="0"/>
+              <a:t>12</a:t>
+            </a:fld>
+            <a:endParaRPr lang="en-US" dirty="0"/>
+          </a:p>
+        </p:txBody>
+      </p:sp>
+    </p:spTree>
+    <p:extLst>
+      <p:ext uri="{BB962C8B-B14F-4D97-AF65-F5344CB8AC3E}">
+        <p14:creationId xmlns:p14="http://schemas.microsoft.com/office/powerpoint/2010/main" val="419392367"/>
+      </p:ext>
+    </p:extLst>
+  </p:cSld>
+  <p:clrMapOvr>
+    <a:masterClrMapping/>
+  </p:clrMapOvr>
+</p:notes>
+</file>
+
+<file path=ppt/notesSlides/notesSlide3.xml><?xml version="1.0" encoding="utf-8"?>
+<p:notes xmlns:a="http://schemas.openxmlformats.org/drawingml/2006/main" xmlns:r="http://schemas.openxmlformats.org/officeDocument/2006/relationships" xmlns:p="http://schemas.openxmlformats.org/presentationml/2006/main">
+  <p:cSld>
+    <p:spTree>
+      <p:nvGrpSpPr>
+        <p:cNvPr id="1" name=""/>
+        <p:cNvGrpSpPr/>
+        <p:nvPr/>
+      </p:nvGrpSpPr>
+      <p:grpSpPr>
+        <a:xfrm>
+          <a:off x="0" y="0"/>
+          <a:ext cx="0" cy="0"/>
+          <a:chOff x="0" y="0"/>
+          <a:chExt cx="0" cy="0"/>
+        </a:xfrm>
+      </p:grpSpPr>
+      <p:sp>
+        <p:nvSpPr>
+          <p:cNvPr id="2" name="Slide Image Placeholder 1"/>
+          <p:cNvSpPr>
+            <a:spLocks noGrp="1" noRot="1" noChangeAspect="1"/>
+          </p:cNvSpPr>
+          <p:nvPr>
+            <p:ph type="sldImg"/>
+          </p:nvPr>
+        </p:nvSpPr>
+        <p:spPr/>
+      </p:sp>
+      <p:sp>
+        <p:nvSpPr>
+          <p:cNvPr id="3" name="Notes Placeholder 2"/>
+          <p:cNvSpPr>
+            <a:spLocks noGrp="1"/>
+          </p:cNvSpPr>
+          <p:nvPr>
+            <p:ph type="body" idx="1"/>
+          </p:nvPr>
+        </p:nvSpPr>
+        <p:spPr/>
+        <p:txBody>
+          <a:bodyPr/>
+          <a:lstStyle/>
           <a:p>
             <a:pPr marL="0" marR="0" lvl="0" indent="0" algn="l" defTabSz="914400" rtl="0" eaLnBrk="1" fontAlgn="auto" latinLnBrk="0" hangingPunct="1">
               <a:lnSpc>
@@ -714,7 +859,224 @@
                 <a:ea typeface="+mn-ea"/>
                 <a:cs typeface="+mn-cs"/>
               </a:rPr>
-              <a:t>The 701 N Sacramento Lot contains the most diverse collection of cars, Wacker has the least diverse collection, at least by license plate. </a:t>
+              <a:t>The 701 N. Sacramento site received 48 percent of the towed cars in our data set and Lower Wacker received two percent. </a:t>
+            </a:r>
+            <a:endParaRPr lang="en-US" dirty="0"/>
+          </a:p>
+          <a:p>
+            <a:endParaRPr lang="en-US" dirty="0"/>
+          </a:p>
+        </p:txBody>
+      </p:sp>
+      <p:sp>
+        <p:nvSpPr>
+          <p:cNvPr id="4" name="Slide Number Placeholder 3"/>
+          <p:cNvSpPr>
+            <a:spLocks noGrp="1"/>
+          </p:cNvSpPr>
+          <p:nvPr>
+            <p:ph type="sldNum" sz="quarter" idx="5"/>
+          </p:nvPr>
+        </p:nvSpPr>
+        <p:spPr/>
+        <p:txBody>
+          <a:bodyPr/>
+          <a:lstStyle/>
+          <a:p>
+            <a:fld id="{1ABBD873-08CC-CF45-9A1C-8FC61122CEB0}" type="slidenum">
+              <a:rPr lang="en-US" smtClean="0"/>
+              <a:t>13</a:t>
+            </a:fld>
+            <a:endParaRPr lang="en-US" dirty="0"/>
+          </a:p>
+        </p:txBody>
+      </p:sp>
+    </p:spTree>
+    <p:extLst>
+      <p:ext uri="{BB962C8B-B14F-4D97-AF65-F5344CB8AC3E}">
+        <p14:creationId xmlns:p14="http://schemas.microsoft.com/office/powerpoint/2010/main" val="477284492"/>
+      </p:ext>
+    </p:extLst>
+  </p:cSld>
+  <p:clrMapOvr>
+    <a:masterClrMapping/>
+  </p:clrMapOvr>
+</p:notes>
+</file>
+
+<file path=ppt/notesSlides/notesSlide4.xml><?xml version="1.0" encoding="utf-8"?>
+<p:notes xmlns:a="http://schemas.openxmlformats.org/drawingml/2006/main" xmlns:r="http://schemas.openxmlformats.org/officeDocument/2006/relationships" xmlns:p="http://schemas.openxmlformats.org/presentationml/2006/main">
+  <p:cSld>
+    <p:spTree>
+      <p:nvGrpSpPr>
+        <p:cNvPr id="1" name=""/>
+        <p:cNvGrpSpPr/>
+        <p:nvPr/>
+      </p:nvGrpSpPr>
+      <p:grpSpPr>
+        <a:xfrm>
+          <a:off x="0" y="0"/>
+          <a:ext cx="0" cy="0"/>
+          <a:chOff x="0" y="0"/>
+          <a:chExt cx="0" cy="0"/>
+        </a:xfrm>
+      </p:grpSpPr>
+      <p:sp>
+        <p:nvSpPr>
+          <p:cNvPr id="2" name="Slide Image Placeholder 1"/>
+          <p:cNvSpPr>
+            <a:spLocks noGrp="1" noRot="1" noChangeAspect="1"/>
+          </p:cNvSpPr>
+          <p:nvPr>
+            <p:ph type="sldImg"/>
+          </p:nvPr>
+        </p:nvSpPr>
+        <p:spPr/>
+      </p:sp>
+      <p:sp>
+        <p:nvSpPr>
+          <p:cNvPr id="3" name="Notes Placeholder 2"/>
+          <p:cNvSpPr>
+            <a:spLocks noGrp="1"/>
+          </p:cNvSpPr>
+          <p:nvPr>
+            <p:ph type="body" idx="1"/>
+          </p:nvPr>
+        </p:nvSpPr>
+        <p:spPr/>
+        <p:txBody>
+          <a:bodyPr/>
+          <a:lstStyle/>
+          <a:p>
+            <a:r>
+              <a:rPr lang="en-US" sz="1200" kern="1200" dirty="0">
+                <a:solidFill>
+                  <a:schemeClr val="tx1"/>
+                </a:solidFill>
+                <a:effectLst/>
+                <a:latin typeface="+mn-lt"/>
+                <a:ea typeface="+mn-ea"/>
+                <a:cs typeface="+mn-cs"/>
+              </a:rPr>
+              <a:t>Using the Plate variable in the dataset, we looked at to which lot each vehicle went. We see here in the states represented in each of the tow lots. The darker color represents at least one state plate.</a:t>
+            </a:r>
+          </a:p>
+          <a:p>
+            <a:endParaRPr lang="en-US" sz="1200" kern="1200" dirty="0">
+              <a:solidFill>
+                <a:schemeClr val="tx1"/>
+              </a:solidFill>
+              <a:effectLst/>
+              <a:latin typeface="+mn-lt"/>
+              <a:ea typeface="+mn-ea"/>
+              <a:cs typeface="+mn-cs"/>
+            </a:endParaRPr>
+          </a:p>
+          <a:p>
+            <a:r>
+              <a:rPr lang="en-US" sz="1200" kern="1200" dirty="0">
+                <a:solidFill>
+                  <a:schemeClr val="tx1"/>
+                </a:solidFill>
+                <a:effectLst/>
+                <a:latin typeface="+mn-lt"/>
+                <a:ea typeface="+mn-ea"/>
+                <a:cs typeface="+mn-cs"/>
+              </a:rPr>
+              <a:t>Looking at this chart, we see 37 states different represented in Chicago tow lots. Illinois is represented most frequently and in each of the four lots. Indiana, Wisconsin, and Michigan are well represented by percentage as well as in each three of the four lots. </a:t>
+            </a:r>
+          </a:p>
+          <a:p>
+            <a:endParaRPr lang="en-US" dirty="0"/>
+          </a:p>
+          <a:p>
+            <a:pPr marL="0" marR="0" lvl="0" indent="0" algn="l" defTabSz="914400" rtl="0" eaLnBrk="1" fontAlgn="auto" latinLnBrk="0" hangingPunct="1">
+              <a:lnSpc>
+                <a:spcPct val="100000"/>
+              </a:lnSpc>
+              <a:spcBef>
+                <a:spcPts val="0"/>
+              </a:spcBef>
+              <a:spcAft>
+                <a:spcPts val="0"/>
+              </a:spcAft>
+              <a:buClrTx/>
+              <a:buSzTx/>
+              <a:buFontTx/>
+              <a:buNone/>
+              <a:tabLst/>
+              <a:defRPr/>
+            </a:pPr>
+            <a:r>
+              <a:rPr lang="en-US" sz="1200" kern="1200" dirty="0">
+                <a:solidFill>
+                  <a:schemeClr val="tx1"/>
+                </a:solidFill>
+                <a:effectLst/>
+                <a:latin typeface="+mn-lt"/>
+                <a:ea typeface="+mn-ea"/>
+                <a:cs typeface="+mn-cs"/>
+              </a:rPr>
+              <a:t>The 701 N Sacramento Lot contains the most diverse collection of cars by state (32 of the 37 total states are represented), Wacker has the least diverse collection, at least by license plate, excluding O'Hare of course.</a:t>
+            </a:r>
+          </a:p>
+          <a:p>
+            <a:pPr marL="0" marR="0" lvl="0" indent="0" algn="l" defTabSz="914400" rtl="0" eaLnBrk="1" fontAlgn="auto" latinLnBrk="0" hangingPunct="1">
+              <a:lnSpc>
+                <a:spcPct val="100000"/>
+              </a:lnSpc>
+              <a:spcBef>
+                <a:spcPts val="0"/>
+              </a:spcBef>
+              <a:spcAft>
+                <a:spcPts val="0"/>
+              </a:spcAft>
+              <a:buClrTx/>
+              <a:buSzTx/>
+              <a:buFontTx/>
+              <a:buNone/>
+              <a:tabLst/>
+              <a:defRPr/>
+            </a:pPr>
+            <a:endParaRPr lang="en-US" sz="1200" kern="1200" dirty="0">
+              <a:solidFill>
+                <a:schemeClr val="tx1"/>
+              </a:solidFill>
+              <a:effectLst/>
+              <a:latin typeface="+mn-lt"/>
+              <a:ea typeface="+mn-ea"/>
+              <a:cs typeface="+mn-cs"/>
+            </a:endParaRPr>
+          </a:p>
+          <a:p>
+            <a:pPr marL="0" marR="0" lvl="0" indent="0" algn="l" defTabSz="914400" rtl="0" eaLnBrk="1" fontAlgn="auto" latinLnBrk="0" hangingPunct="1">
+              <a:lnSpc>
+                <a:spcPct val="100000"/>
+              </a:lnSpc>
+              <a:spcBef>
+                <a:spcPts val="0"/>
+              </a:spcBef>
+              <a:spcAft>
+                <a:spcPts val="0"/>
+              </a:spcAft>
+              <a:buClrTx/>
+              <a:buSzTx/>
+              <a:buFontTx/>
+              <a:buNone/>
+              <a:tabLst/>
+              <a:defRPr/>
+            </a:pPr>
+            <a:r>
+              <a:rPr lang="en-US" sz="1200" kern="1200" dirty="0">
+                <a:solidFill>
+                  <a:schemeClr val="tx1"/>
+                </a:solidFill>
+                <a:effectLst/>
+                <a:latin typeface="+mn-lt"/>
+                <a:ea typeface="+mn-ea"/>
+                <a:cs typeface="+mn-cs"/>
+              </a:rPr>
+              <a:t>Any comments, concerns or curiosities?</a:t>
             </a:r>
           </a:p>
           <a:p>
@@ -741,7 +1103,7 @@
               <a:rPr lang="en-US" smtClean="0"/>
               <a:t>14</a:t>
             </a:fld>
-            <a:endParaRPr lang="en-US"/>
+            <a:endParaRPr lang="en-US" dirty="0"/>
           </a:p>
         </p:txBody>
       </p:sp>
@@ -905,9 +1267,9 @@
           <a:p>
             <a:fld id="{9E8F0690-90F3-3240-A8D4-937BF079F265}" type="datetimeFigureOut">
               <a:rPr lang="en-US" smtClean="0"/>
-              <a:t>3/30/2019</a:t>
+              <a:t>3/30/19</a:t>
             </a:fld>
-            <a:endParaRPr lang="en-US"/>
+            <a:endParaRPr lang="en-US" dirty="0"/>
           </a:p>
         </p:txBody>
       </p:sp>
@@ -932,7 +1294,7 @@
           <a:bodyPr/>
           <a:lstStyle/>
           <a:p>
-            <a:endParaRPr lang="en-US"/>
+            <a:endParaRPr lang="en-US" dirty="0"/>
           </a:p>
         </p:txBody>
       </p:sp>
@@ -961,7 +1323,7 @@
               <a:rPr lang="en-US" smtClean="0"/>
               <a:t>‹#›</a:t>
             </a:fld>
-            <a:endParaRPr lang="en-US"/>
+            <a:endParaRPr lang="en-US" dirty="0"/>
           </a:p>
         </p:txBody>
       </p:sp>
@@ -1103,9 +1465,9 @@
           <a:p>
             <a:fld id="{9E8F0690-90F3-3240-A8D4-937BF079F265}" type="datetimeFigureOut">
               <a:rPr lang="en-US" smtClean="0"/>
-              <a:t>3/30/2019</a:t>
+              <a:t>3/30/19</a:t>
             </a:fld>
-            <a:endParaRPr lang="en-US"/>
+            <a:endParaRPr lang="en-US" dirty="0"/>
           </a:p>
         </p:txBody>
       </p:sp>
@@ -1130,7 +1492,7 @@
           <a:bodyPr/>
           <a:lstStyle/>
           <a:p>
-            <a:endParaRPr lang="en-US"/>
+            <a:endParaRPr lang="en-US" dirty="0"/>
           </a:p>
         </p:txBody>
       </p:sp>
@@ -1159,7 +1521,7 @@
               <a:rPr lang="en-US" smtClean="0"/>
               <a:t>‹#›</a:t>
             </a:fld>
-            <a:endParaRPr lang="en-US"/>
+            <a:endParaRPr lang="en-US" dirty="0"/>
           </a:p>
         </p:txBody>
       </p:sp>
@@ -1311,9 +1673,9 @@
           <a:p>
             <a:fld id="{9E8F0690-90F3-3240-A8D4-937BF079F265}" type="datetimeFigureOut">
               <a:rPr lang="en-US" smtClean="0"/>
-              <a:t>3/30/2019</a:t>
+              <a:t>3/30/19</a:t>
             </a:fld>
-            <a:endParaRPr lang="en-US"/>
+            <a:endParaRPr lang="en-US" dirty="0"/>
           </a:p>
         </p:txBody>
       </p:sp>
@@ -1338,7 +1700,7 @@
           <a:bodyPr/>
           <a:lstStyle/>
           <a:p>
-            <a:endParaRPr lang="en-US"/>
+            <a:endParaRPr lang="en-US" dirty="0"/>
           </a:p>
         </p:txBody>
       </p:sp>
@@ -1367,7 +1729,7 @@
               <a:rPr lang="en-US" smtClean="0"/>
               <a:t>‹#›</a:t>
             </a:fld>
-            <a:endParaRPr lang="en-US"/>
+            <a:endParaRPr lang="en-US" dirty="0"/>
           </a:p>
         </p:txBody>
       </p:sp>
@@ -1509,9 +1871,9 @@
           <a:p>
             <a:fld id="{9E8F0690-90F3-3240-A8D4-937BF079F265}" type="datetimeFigureOut">
               <a:rPr lang="en-US" smtClean="0"/>
-              <a:t>3/30/2019</a:t>
+              <a:t>3/30/19</a:t>
             </a:fld>
-            <a:endParaRPr lang="en-US"/>
+            <a:endParaRPr lang="en-US" dirty="0"/>
           </a:p>
         </p:txBody>
       </p:sp>
@@ -1536,7 +1898,7 @@
           <a:bodyPr/>
           <a:lstStyle/>
           <a:p>
-            <a:endParaRPr lang="en-US"/>
+            <a:endParaRPr lang="en-US" dirty="0"/>
           </a:p>
         </p:txBody>
       </p:sp>
@@ -1565,7 +1927,7 @@
               <a:rPr lang="en-US" smtClean="0"/>
               <a:t>‹#›</a:t>
             </a:fld>
-            <a:endParaRPr lang="en-US"/>
+            <a:endParaRPr lang="en-US" dirty="0"/>
           </a:p>
         </p:txBody>
       </p:sp>
@@ -1784,9 +2146,9 @@
           <a:p>
             <a:fld id="{9E8F0690-90F3-3240-A8D4-937BF079F265}" type="datetimeFigureOut">
               <a:rPr lang="en-US" smtClean="0"/>
-              <a:t>3/30/2019</a:t>
+              <a:t>3/30/19</a:t>
             </a:fld>
-            <a:endParaRPr lang="en-US"/>
+            <a:endParaRPr lang="en-US" dirty="0"/>
           </a:p>
         </p:txBody>
       </p:sp>
@@ -1811,7 +2173,7 @@
           <a:bodyPr/>
           <a:lstStyle/>
           <a:p>
-            <a:endParaRPr lang="en-US"/>
+            <a:endParaRPr lang="en-US" dirty="0"/>
           </a:p>
         </p:txBody>
       </p:sp>
@@ -1840,7 +2202,7 @@
               <a:rPr lang="en-US" smtClean="0"/>
               <a:t>‹#›</a:t>
             </a:fld>
-            <a:endParaRPr lang="en-US"/>
+            <a:endParaRPr lang="en-US" dirty="0"/>
           </a:p>
         </p:txBody>
       </p:sp>
@@ -2049,9 +2411,9 @@
           <a:p>
             <a:fld id="{9E8F0690-90F3-3240-A8D4-937BF079F265}" type="datetimeFigureOut">
               <a:rPr lang="en-US" smtClean="0"/>
-              <a:t>3/30/2019</a:t>
+              <a:t>3/30/19</a:t>
             </a:fld>
-            <a:endParaRPr lang="en-US"/>
+            <a:endParaRPr lang="en-US" dirty="0"/>
           </a:p>
         </p:txBody>
       </p:sp>
@@ -2076,7 +2438,7 @@
           <a:bodyPr/>
           <a:lstStyle/>
           <a:p>
-            <a:endParaRPr lang="en-US"/>
+            <a:endParaRPr lang="en-US" dirty="0"/>
           </a:p>
         </p:txBody>
       </p:sp>
@@ -2105,7 +2467,7 @@
               <a:rPr lang="en-US" smtClean="0"/>
               <a:t>‹#›</a:t>
             </a:fld>
-            <a:endParaRPr lang="en-US"/>
+            <a:endParaRPr lang="en-US" dirty="0"/>
           </a:p>
         </p:txBody>
       </p:sp>
@@ -2461,9 +2823,9 @@
           <a:p>
             <a:fld id="{9E8F0690-90F3-3240-A8D4-937BF079F265}" type="datetimeFigureOut">
               <a:rPr lang="en-US" smtClean="0"/>
-              <a:t>3/30/2019</a:t>
+              <a:t>3/30/19</a:t>
             </a:fld>
-            <a:endParaRPr lang="en-US"/>
+            <a:endParaRPr lang="en-US" dirty="0"/>
           </a:p>
         </p:txBody>
       </p:sp>
@@ -2488,7 +2850,7 @@
           <a:bodyPr/>
           <a:lstStyle/>
           <a:p>
-            <a:endParaRPr lang="en-US"/>
+            <a:endParaRPr lang="en-US" dirty="0"/>
           </a:p>
         </p:txBody>
       </p:sp>
@@ -2517,7 +2879,7 @@
               <a:rPr lang="en-US" smtClean="0"/>
               <a:t>‹#›</a:t>
             </a:fld>
-            <a:endParaRPr lang="en-US"/>
+            <a:endParaRPr lang="en-US" dirty="0"/>
           </a:p>
         </p:txBody>
       </p:sp>
@@ -2602,9 +2964,9 @@
           <a:p>
             <a:fld id="{9E8F0690-90F3-3240-A8D4-937BF079F265}" type="datetimeFigureOut">
               <a:rPr lang="en-US" smtClean="0"/>
-              <a:t>3/30/2019</a:t>
+              <a:t>3/30/19</a:t>
             </a:fld>
-            <a:endParaRPr lang="en-US"/>
+            <a:endParaRPr lang="en-US" dirty="0"/>
           </a:p>
         </p:txBody>
       </p:sp>
@@ -2629,7 +2991,7 @@
           <a:bodyPr/>
           <a:lstStyle/>
           <a:p>
-            <a:endParaRPr lang="en-US"/>
+            <a:endParaRPr lang="en-US" dirty="0"/>
           </a:p>
         </p:txBody>
       </p:sp>
@@ -2658,7 +3020,7 @@
               <a:rPr lang="en-US" smtClean="0"/>
               <a:t>‹#›</a:t>
             </a:fld>
-            <a:endParaRPr lang="en-US"/>
+            <a:endParaRPr lang="en-US" dirty="0"/>
           </a:p>
         </p:txBody>
       </p:sp>
@@ -2715,9 +3077,9 @@
           <a:p>
             <a:fld id="{9E8F0690-90F3-3240-A8D4-937BF079F265}" type="datetimeFigureOut">
               <a:rPr lang="en-US" smtClean="0"/>
-              <a:t>3/30/2019</a:t>
+              <a:t>3/30/19</a:t>
             </a:fld>
-            <a:endParaRPr lang="en-US"/>
+            <a:endParaRPr lang="en-US" dirty="0"/>
           </a:p>
         </p:txBody>
       </p:sp>
@@ -2742,7 +3104,7 @@
           <a:bodyPr/>
           <a:lstStyle/>
           <a:p>
-            <a:endParaRPr lang="en-US"/>
+            <a:endParaRPr lang="en-US" dirty="0"/>
           </a:p>
         </p:txBody>
       </p:sp>
@@ -2771,7 +3133,7 @@
               <a:rPr lang="en-US" smtClean="0"/>
               <a:t>‹#›</a:t>
             </a:fld>
-            <a:endParaRPr lang="en-US"/>
+            <a:endParaRPr lang="en-US" dirty="0"/>
           </a:p>
         </p:txBody>
       </p:sp>
@@ -3026,9 +3388,9 @@
           <a:p>
             <a:fld id="{9E8F0690-90F3-3240-A8D4-937BF079F265}" type="datetimeFigureOut">
               <a:rPr lang="en-US" smtClean="0"/>
-              <a:t>3/30/2019</a:t>
+              <a:t>3/30/19</a:t>
             </a:fld>
-            <a:endParaRPr lang="en-US"/>
+            <a:endParaRPr lang="en-US" dirty="0"/>
           </a:p>
         </p:txBody>
       </p:sp>
@@ -3053,7 +3415,7 @@
           <a:bodyPr/>
           <a:lstStyle/>
           <a:p>
-            <a:endParaRPr lang="en-US"/>
+            <a:endParaRPr lang="en-US" dirty="0"/>
           </a:p>
         </p:txBody>
       </p:sp>
@@ -3082,7 +3444,7 @@
               <a:rPr lang="en-US" smtClean="0"/>
               <a:t>‹#›</a:t>
             </a:fld>
-            <a:endParaRPr lang="en-US"/>
+            <a:endParaRPr lang="en-US" dirty="0"/>
           </a:p>
         </p:txBody>
       </p:sp>
@@ -3216,7 +3578,7 @@
             </a:lvl9pPr>
           </a:lstStyle>
           <a:p>
-            <a:endParaRPr lang="en-US"/>
+            <a:endParaRPr lang="en-US" dirty="0"/>
           </a:p>
         </p:txBody>
       </p:sp>
@@ -3314,9 +3676,9 @@
           <a:p>
             <a:fld id="{9E8F0690-90F3-3240-A8D4-937BF079F265}" type="datetimeFigureOut">
               <a:rPr lang="en-US" smtClean="0"/>
-              <a:t>3/30/2019</a:t>
+              <a:t>3/30/19</a:t>
             </a:fld>
-            <a:endParaRPr lang="en-US"/>
+            <a:endParaRPr lang="en-US" dirty="0"/>
           </a:p>
         </p:txBody>
       </p:sp>
@@ -3341,7 +3703,7 @@
           <a:bodyPr/>
           <a:lstStyle/>
           <a:p>
-            <a:endParaRPr lang="en-US"/>
+            <a:endParaRPr lang="en-US" dirty="0"/>
           </a:p>
         </p:txBody>
       </p:sp>
@@ -3370,7 +3732,7 @@
               <a:rPr lang="en-US" smtClean="0"/>
               <a:t>‹#›</a:t>
             </a:fld>
-            <a:endParaRPr lang="en-US"/>
+            <a:endParaRPr lang="en-US" dirty="0"/>
           </a:p>
         </p:txBody>
       </p:sp>
@@ -3555,9 +3917,9 @@
           <a:p>
             <a:fld id="{9E8F0690-90F3-3240-A8D4-937BF079F265}" type="datetimeFigureOut">
               <a:rPr lang="en-US" smtClean="0"/>
-              <a:t>3/30/2019</a:t>
+              <a:t>3/30/19</a:t>
             </a:fld>
-            <a:endParaRPr lang="en-US"/>
+            <a:endParaRPr lang="en-US" dirty="0"/>
           </a:p>
         </p:txBody>
       </p:sp>
@@ -3600,7 +3962,7 @@
             </a:lvl1pPr>
           </a:lstStyle>
           <a:p>
-            <a:endParaRPr lang="en-US"/>
+            <a:endParaRPr lang="en-US" dirty="0"/>
           </a:p>
         </p:txBody>
       </p:sp>
@@ -3647,7 +4009,7 @@
               <a:rPr lang="en-US" smtClean="0"/>
               <a:t>‹#›</a:t>
             </a:fld>
-            <a:endParaRPr lang="en-US"/>
+            <a:endParaRPr lang="en-US" dirty="0"/>
           </a:p>
         </p:txBody>
       </p:sp>
@@ -4094,7 +4456,7 @@
           <a:p>
             <a:pPr marL="457200" lvl="1" algn="l"/>
             <a:r>
-              <a:rPr lang="en-US" sz="3200" kern="1200">
+              <a:rPr lang="en-US" sz="3200" kern="1200" dirty="0">
                 <a:solidFill>
                   <a:schemeClr val="tx1"/>
                 </a:solidFill>
@@ -4104,14 +4466,6 @@
               </a:rPr>
               <a:t>5. What percentage of towed cars are abandoned cars?</a:t>
             </a:r>
-            <a:endParaRPr lang="en-US" sz="3200" kern="1200" dirty="0">
-              <a:solidFill>
-                <a:schemeClr val="tx1"/>
-              </a:solidFill>
-              <a:latin typeface="+mn-lt"/>
-              <a:ea typeface="+mn-ea"/>
-              <a:cs typeface="+mn-cs"/>
-            </a:endParaRPr>
           </a:p>
         </p:txBody>
       </p:sp>
@@ -4289,7 +4643,7 @@
           </p:nvPr>
         </p:nvPicPr>
         <p:blipFill>
-          <a:blip r:embed="rId2"/>
+          <a:blip r:embed="rId3"/>
           <a:stretch>
             <a:fillRect/>
           </a:stretch>
@@ -4554,7 +4908,7 @@
           <p:nvPr/>
         </p:nvPicPr>
         <p:blipFill>
-          <a:blip r:embed="rId2"/>
+          <a:blip r:embed="rId3"/>
           <a:stretch>
             <a:fillRect/>
           </a:stretch>
@@ -4731,6 +5085,89 @@
     <p:extLst>
       <p:ext uri="{BB962C8B-B14F-4D97-AF65-F5344CB8AC3E}">
         <p14:creationId xmlns:p14="http://schemas.microsoft.com/office/powerpoint/2010/main" val="2864676136"/>
+      </p:ext>
+    </p:extLst>
+  </p:cSld>
+  <p:clrMapOvr>
+    <a:masterClrMapping/>
+  </p:clrMapOvr>
+</p:sld>
+</file>
+
+<file path=ppt/slides/slide15.xml><?xml version="1.0" encoding="utf-8"?>
+<p:sld xmlns:a="http://schemas.openxmlformats.org/drawingml/2006/main" xmlns:r="http://schemas.openxmlformats.org/officeDocument/2006/relationships" xmlns:p="http://schemas.openxmlformats.org/presentationml/2006/main">
+  <p:cSld>
+    <p:spTree>
+      <p:nvGrpSpPr>
+        <p:cNvPr id="1" name=""/>
+        <p:cNvGrpSpPr/>
+        <p:nvPr/>
+      </p:nvGrpSpPr>
+      <p:grpSpPr>
+        <a:xfrm>
+          <a:off x="0" y="0"/>
+          <a:ext cx="0" cy="0"/>
+          <a:chOff x="0" y="0"/>
+          <a:chExt cx="0" cy="0"/>
+        </a:xfrm>
+      </p:grpSpPr>
+      <p:sp>
+        <p:nvSpPr>
+          <p:cNvPr id="4" name="Title 3">
+            <a:extLst>
+              <a:ext uri="{FF2B5EF4-FFF2-40B4-BE49-F238E27FC236}">
+                <a16:creationId xmlns:a16="http://schemas.microsoft.com/office/drawing/2014/main" id="{3DB1B837-6DAF-C944-BA3C-3BEF95A84420}"/>
+              </a:ext>
+            </a:extLst>
+          </p:cNvPr>
+          <p:cNvSpPr>
+            <a:spLocks noGrp="1"/>
+          </p:cNvSpPr>
+          <p:nvPr>
+            <p:ph type="title"/>
+          </p:nvPr>
+        </p:nvSpPr>
+        <p:spPr/>
+        <p:txBody>
+          <a:bodyPr/>
+          <a:lstStyle/>
+          <a:p>
+            <a:r>
+              <a:rPr lang="en-US" dirty="0"/>
+              <a:t>Comments, concern or curiosities?</a:t>
+            </a:r>
+          </a:p>
+        </p:txBody>
+      </p:sp>
+      <p:sp>
+        <p:nvSpPr>
+          <p:cNvPr id="5" name="Text Placeholder 4">
+            <a:extLst>
+              <a:ext uri="{FF2B5EF4-FFF2-40B4-BE49-F238E27FC236}">
+                <a16:creationId xmlns:a16="http://schemas.microsoft.com/office/drawing/2014/main" id="{FB4480B0-28FB-1540-A99C-82939F234D64}"/>
+              </a:ext>
+            </a:extLst>
+          </p:cNvPr>
+          <p:cNvSpPr>
+            <a:spLocks noGrp="1"/>
+          </p:cNvSpPr>
+          <p:nvPr>
+            <p:ph type="body" idx="1"/>
+          </p:nvPr>
+        </p:nvSpPr>
+        <p:spPr/>
+        <p:txBody>
+          <a:bodyPr/>
+          <a:lstStyle/>
+          <a:p>
+            <a:endParaRPr lang="en-US" dirty="0"/>
+          </a:p>
+        </p:txBody>
+      </p:sp>
+    </p:spTree>
+    <p:extLst>
+      <p:ext uri="{BB962C8B-B14F-4D97-AF65-F5344CB8AC3E}">
+        <p14:creationId xmlns:p14="http://schemas.microsoft.com/office/powerpoint/2010/main" val="791672599"/>
       </p:ext>
     </p:extLst>
   </p:cSld>
@@ -5025,7 +5462,7 @@
           <a:lstStyle/>
           <a:p>
             <a:pPr algn="ctr"/>
-            <a:endParaRPr lang="en-US"/>
+            <a:endParaRPr lang="en-US" dirty="0"/>
           </a:p>
         </p:txBody>
       </p:sp>
@@ -5095,19 +5532,7 @@
               <a:rPr lang="en-US" sz="3200" dirty="0">
                 <a:latin typeface="Graphik" panose="020B0503030202060203" pitchFamily="34" charset="0"/>
               </a:rPr>
-              <a:t>Does the day of the week </a:t>
-            </a:r>
-            <a:r>
-              <a:rPr lang="en-US" sz="3200">
-                <a:latin typeface="Graphik" panose="020B0503030202060203" pitchFamily="34" charset="0"/>
-              </a:rPr>
-              <a:t>have any </a:t>
-            </a:r>
-            <a:r>
-              <a:rPr lang="en-US" sz="3200" dirty="0">
-                <a:latin typeface="Graphik" panose="020B0503030202060203" pitchFamily="34" charset="0"/>
-              </a:rPr>
-              <a:t>impact?</a:t>
+              <a:t>Does the day of the week have any impact?</a:t>
             </a:r>
           </a:p>
         </p:txBody>

</xml_diff>